<commit_message>
feat: last last details
</commit_message>
<xml_diff>
--- a/kotlin.pptx
+++ b/kotlin.pptx
@@ -5,10 +5,10 @@
     <p:sldMasterId id="2147483840" r:id="rId1"/>
   </p:sldMasterIdLst>
   <p:notesMasterIdLst>
-    <p:notesMasterId r:id="rId18"/>
+    <p:notesMasterId r:id="rId19"/>
   </p:notesMasterIdLst>
   <p:handoutMasterIdLst>
-    <p:handoutMasterId r:id="rId19"/>
+    <p:handoutMasterId r:id="rId20"/>
   </p:handoutMasterIdLst>
   <p:sldIdLst>
     <p:sldId id="256" r:id="rId2"/>
@@ -20,13 +20,14 @@
     <p:sldId id="271" r:id="rId8"/>
     <p:sldId id="264" r:id="rId9"/>
     <p:sldId id="265" r:id="rId10"/>
-    <p:sldId id="266" r:id="rId11"/>
-    <p:sldId id="257" r:id="rId12"/>
-    <p:sldId id="263" r:id="rId13"/>
-    <p:sldId id="267" r:id="rId14"/>
-    <p:sldId id="268" r:id="rId15"/>
-    <p:sldId id="269" r:id="rId16"/>
-    <p:sldId id="270" r:id="rId17"/>
+    <p:sldId id="272" r:id="rId11"/>
+    <p:sldId id="266" r:id="rId12"/>
+    <p:sldId id="273" r:id="rId13"/>
+    <p:sldId id="257" r:id="rId14"/>
+    <p:sldId id="263" r:id="rId15"/>
+    <p:sldId id="268" r:id="rId16"/>
+    <p:sldId id="274" r:id="rId17"/>
+    <p:sldId id="270" r:id="rId18"/>
   </p:sldIdLst>
   <p:sldSz cx="12192000" cy="6858000"/>
   <p:notesSz cx="6858000" cy="9144000"/>
@@ -129,6 +130,9 @@
     <p:ext uri="{EFAFB233-063F-42B5-8137-9DF3F51BA10A}">
       <p15:sldGuideLst xmlns:p15="http://schemas.microsoft.com/office/powerpoint/2012/main"/>
     </p:ext>
+    <p:ext uri="{2D200454-40CA-4A62-9FC3-DE9A4176ACB9}">
+      <p15:notesGuideLst xmlns:p15="http://schemas.microsoft.com/office/powerpoint/2012/main"/>
+    </p:ext>
   </p:extLst>
 </p:presentation>
 </file>
@@ -227,7 +231,7 @@
           <a:p>
             <a:fld id="{C0691E93-FCE9-4637-A231-41265759DF2A}" type="datetimeFigureOut">
               <a:rPr lang="fr-FR" smtClean="0"/>
-              <a:t>27/04/2021</a:t>
+              <a:t>29/04/2021</a:t>
             </a:fld>
             <a:endParaRPr lang="fr-FR"/>
           </a:p>
@@ -404,7 +408,7 @@
           <a:p>
             <a:fld id="{F55AC44C-65B7-406C-A849-BD91E2E102C5}" type="datetimeFigureOut">
               <a:rPr lang="fr-FR" smtClean="0"/>
-              <a:t>27/04/2021</a:t>
+              <a:t>29/04/2021</a:t>
             </a:fld>
             <a:endParaRPr lang="fr-FR"/>
           </a:p>
@@ -1360,7 +1364,7 @@
           <a:p>
             <a:fld id="{3E9A7E9A-ED42-4501-8D90-C284A0C74BA0}" type="datetime1">
               <a:rPr lang="fr-FR" smtClean="0"/>
-              <a:t>27/04/2021</a:t>
+              <a:t>29/04/2021</a:t>
             </a:fld>
             <a:endParaRPr lang="fr-FR"/>
           </a:p>
@@ -2521,7 +2525,7 @@
           <a:p>
             <a:fld id="{24CA3DDA-859A-452E-BD9E-592C4F7E92B0}" type="datetime1">
               <a:rPr lang="fr-FR" smtClean="0"/>
-              <a:t>27/04/2021</a:t>
+              <a:t>29/04/2021</a:t>
             </a:fld>
             <a:endParaRPr lang="fr-FR"/>
           </a:p>
@@ -3575,7 +3579,7 @@
           <a:p>
             <a:fld id="{7741E306-677C-4D59-B983-ACA20A60A714}" type="datetime1">
               <a:rPr lang="fr-FR" smtClean="0"/>
-              <a:t>27/04/2021</a:t>
+              <a:t>29/04/2021</a:t>
             </a:fld>
             <a:endParaRPr lang="fr-FR"/>
           </a:p>
@@ -4788,7 +4792,7 @@
           <a:p>
             <a:fld id="{560D6118-E199-4283-A037-D686B2729C02}" type="datetime1">
               <a:rPr lang="fr-FR" smtClean="0"/>
-              <a:t>27/04/2021</a:t>
+              <a:t>29/04/2021</a:t>
             </a:fld>
             <a:endParaRPr lang="fr-FR"/>
           </a:p>
@@ -5892,7 +5896,7 @@
           <a:p>
             <a:fld id="{64D69B36-2E20-41E4-AD84-00A5CEA4E1CD}" type="datetime1">
               <a:rPr lang="fr-FR" smtClean="0"/>
-              <a:t>27/04/2021</a:t>
+              <a:t>29/04/2021</a:t>
             </a:fld>
             <a:endParaRPr lang="fr-FR"/>
           </a:p>
@@ -6544,7 +6548,7 @@
           <a:p>
             <a:fld id="{87D139BB-ADF5-485C-A325-F0921CEAB62C}" type="datetime1">
               <a:rPr lang="fr-FR" smtClean="0"/>
-              <a:t>27/04/2021</a:t>
+              <a:t>29/04/2021</a:t>
             </a:fld>
             <a:endParaRPr lang="fr-FR"/>
           </a:p>
@@ -7391,7 +7395,7 @@
           <a:p>
             <a:fld id="{E06A911B-C7E7-4F4A-9F62-66711C38B193}" type="datetime1">
               <a:rPr lang="fr-FR" smtClean="0"/>
-              <a:t>27/04/2021</a:t>
+              <a:t>29/04/2021</a:t>
             </a:fld>
             <a:endParaRPr lang="fr-FR"/>
           </a:p>
@@ -7576,7 +7580,7 @@
           <a:p>
             <a:fld id="{011731C5-66D9-40D1-AD62-85284915D8C0}" type="datetime1">
               <a:rPr lang="fr-FR" smtClean="0"/>
-              <a:t>27/04/2021</a:t>
+              <a:t>29/04/2021</a:t>
             </a:fld>
             <a:endParaRPr lang="fr-FR"/>
           </a:p>
@@ -8617,7 +8621,7 @@
           <a:p>
             <a:fld id="{69A0C85A-3B63-44EA-B3D9-9A0F52CCE6A2}" type="datetime1">
               <a:rPr lang="fr-FR" smtClean="0"/>
-              <a:t>27/04/2021</a:t>
+              <a:t>29/04/2021</a:t>
             </a:fld>
             <a:endParaRPr lang="fr-FR"/>
           </a:p>
@@ -8833,7 +8837,7 @@
           <a:p>
             <a:fld id="{3CE03D01-19B8-47BE-948A-3CFA30B826BF}" type="datetime1">
               <a:rPr lang="fr-FR" smtClean="0"/>
-              <a:t>27/04/2021</a:t>
+              <a:t>29/04/2021</a:t>
             </a:fld>
             <a:endParaRPr lang="fr-FR"/>
           </a:p>
@@ -9938,7 +9942,7 @@
           <a:p>
             <a:fld id="{007DEB42-D5C0-4A8E-97F2-008433135B73}" type="datetime1">
               <a:rPr lang="fr-FR" smtClean="0"/>
-              <a:t>27/04/2021</a:t>
+              <a:t>29/04/2021</a:t>
             </a:fld>
             <a:endParaRPr lang="fr-FR"/>
           </a:p>
@@ -10210,7 +10214,7 @@
           <a:p>
             <a:fld id="{179C7A2F-A17B-42D2-BE59-8C278563A5C9}" type="datetime1">
               <a:rPr lang="fr-FR" smtClean="0"/>
-              <a:t>27/04/2021</a:t>
+              <a:t>29/04/2021</a:t>
             </a:fld>
             <a:endParaRPr lang="fr-FR"/>
           </a:p>
@@ -10592,7 +10596,7 @@
           <a:p>
             <a:fld id="{02A30240-5FA3-4E5C-9030-7B7F07508C75}" type="datetime1">
               <a:rPr lang="fr-FR" smtClean="0"/>
-              <a:t>27/04/2021</a:t>
+              <a:t>29/04/2021</a:t>
             </a:fld>
             <a:endParaRPr lang="fr-FR"/>
           </a:p>
@@ -10710,7 +10714,7 @@
           <a:p>
             <a:fld id="{0A5C02E6-A879-4622-BC22-B453EA43177A}" type="datetime1">
               <a:rPr lang="fr-FR" smtClean="0"/>
-              <a:t>27/04/2021</a:t>
+              <a:t>29/04/2021</a:t>
             </a:fld>
             <a:endParaRPr lang="fr-FR"/>
           </a:p>
@@ -10805,7 +10809,7 @@
           <a:p>
             <a:fld id="{E1866222-02FE-4D51-8558-4201C298598E}" type="datetime1">
               <a:rPr lang="fr-FR" smtClean="0"/>
-              <a:t>27/04/2021</a:t>
+              <a:t>29/04/2021</a:t>
             </a:fld>
             <a:endParaRPr lang="fr-FR"/>
           </a:p>
@@ -11957,7 +11961,7 @@
           <a:p>
             <a:fld id="{FC48FF92-93C7-4711-8B84-E9634535DE69}" type="datetime1">
               <a:rPr lang="fr-FR" smtClean="0"/>
-              <a:t>27/04/2021</a:t>
+              <a:t>29/04/2021</a:t>
             </a:fld>
             <a:endParaRPr lang="fr-FR"/>
           </a:p>
@@ -13133,7 +13137,7 @@
           <a:p>
             <a:fld id="{9006B5A5-1C1D-440B-B69F-35DCE3DE75D0}" type="datetime1">
               <a:rPr lang="fr-FR" smtClean="0"/>
-              <a:t>27/04/2021</a:t>
+              <a:t>29/04/2021</a:t>
             </a:fld>
             <a:endParaRPr lang="fr-FR"/>
           </a:p>
@@ -14239,7 +14243,7 @@
           <a:p>
             <a:fld id="{F85A370E-A298-4B06-946F-FB83BDD5ADB9}" type="datetime1">
               <a:rPr lang="fr-FR" smtClean="0"/>
-              <a:t>27/04/2021</a:t>
+              <a:t>29/04/2021</a:t>
             </a:fld>
             <a:endParaRPr lang="fr-FR"/>
           </a:p>
@@ -14918,6 +14922,139 @@
       </p:grpSpPr>
       <p:sp>
         <p:nvSpPr>
+          <p:cNvPr id="4" name="Titre 3">
+            <a:extLst>
+              <a:ext uri="{FF2B5EF4-FFF2-40B4-BE49-F238E27FC236}">
+                <a16:creationId xmlns:a16="http://schemas.microsoft.com/office/drawing/2014/main" id="{D7CD7AA8-571E-4BCD-8FAC-8D9E9CD67FA1}"/>
+              </a:ext>
+            </a:extLst>
+          </p:cNvPr>
+          <p:cNvSpPr>
+            <a:spLocks noGrp="1"/>
+          </p:cNvSpPr>
+          <p:nvPr>
+            <p:ph type="title"/>
+          </p:nvPr>
+        </p:nvSpPr>
+        <p:spPr/>
+        <p:txBody>
+          <a:bodyPr/>
+          <a:lstStyle/>
+          <a:p>
+            <a:r>
+              <a:rPr lang="fr-FR" dirty="0"/>
+              <a:t>Java: Les inconvénients</a:t>
+            </a:r>
+          </a:p>
+        </p:txBody>
+      </p:sp>
+      <p:sp>
+        <p:nvSpPr>
+          <p:cNvPr id="5" name="Espace réservé du contenu 4">
+            <a:extLst>
+              <a:ext uri="{FF2B5EF4-FFF2-40B4-BE49-F238E27FC236}">
+                <a16:creationId xmlns:a16="http://schemas.microsoft.com/office/drawing/2014/main" id="{0D19F22F-C856-457C-BCAD-4EBA84EA45AF}"/>
+              </a:ext>
+            </a:extLst>
+          </p:cNvPr>
+          <p:cNvSpPr>
+            <a:spLocks noGrp="1"/>
+          </p:cNvSpPr>
+          <p:nvPr>
+            <p:ph idx="1"/>
+          </p:nvPr>
+        </p:nvSpPr>
+        <p:spPr>
+          <a:xfrm>
+            <a:off x="1591127" y="3423684"/>
+            <a:ext cx="8761413" cy="2590800"/>
+          </a:xfrm>
+        </p:spPr>
+        <p:txBody>
+          <a:bodyPr>
+            <a:normAutofit/>
+          </a:bodyPr>
+          <a:lstStyle/>
+          <a:p>
+            <a:pPr marL="0" indent="0" algn="ctr">
+              <a:buNone/>
+            </a:pPr>
+            <a:r>
+              <a:rPr lang="fr-FR" sz="2800" dirty="0"/>
+              <a:t>Comment récupérer les éléments d’une liste ainsi que leur index en utilisant les </a:t>
+            </a:r>
+            <a:r>
+              <a:rPr lang="fr-FR" sz="2800" dirty="0" err="1"/>
+              <a:t>stream</a:t>
+            </a:r>
+            <a:r>
+              <a:rPr lang="fr-FR" sz="2800" dirty="0"/>
+              <a:t>?</a:t>
+            </a:r>
+          </a:p>
+        </p:txBody>
+      </p:sp>
+      <p:sp>
+        <p:nvSpPr>
+          <p:cNvPr id="3" name="Espace réservé du numéro de diapositive 2">
+            <a:extLst>
+              <a:ext uri="{FF2B5EF4-FFF2-40B4-BE49-F238E27FC236}">
+                <a16:creationId xmlns:a16="http://schemas.microsoft.com/office/drawing/2014/main" id="{71992CAF-F5EC-45E5-97C5-27DB77154EBD}"/>
+              </a:ext>
+            </a:extLst>
+          </p:cNvPr>
+          <p:cNvSpPr>
+            <a:spLocks noGrp="1"/>
+          </p:cNvSpPr>
+          <p:nvPr>
+            <p:ph type="sldNum" sz="quarter" idx="12"/>
+          </p:nvPr>
+        </p:nvSpPr>
+        <p:spPr/>
+        <p:txBody>
+          <a:bodyPr/>
+          <a:lstStyle/>
+          <a:p>
+            <a:fld id="{4EA40E75-4466-4188-A2CC-18D20372CC4F}" type="slidenum">
+              <a:rPr lang="fr-FR" smtClean="0"/>
+              <a:t>10</a:t>
+            </a:fld>
+            <a:endParaRPr lang="fr-FR" dirty="0"/>
+          </a:p>
+        </p:txBody>
+      </p:sp>
+    </p:spTree>
+    <p:extLst>
+      <p:ext uri="{BB962C8B-B14F-4D97-AF65-F5344CB8AC3E}">
+        <p14:creationId xmlns:p14="http://schemas.microsoft.com/office/powerpoint/2010/main" val="1688148006"/>
+      </p:ext>
+    </p:extLst>
+  </p:cSld>
+  <p:clrMapOvr>
+    <a:masterClrMapping/>
+  </p:clrMapOvr>
+</p:sld>
+</file>
+
+<file path=ppt/slides/slide11.xml><?xml version="1.0" encoding="utf-8"?>
+<p:sld xmlns:a="http://schemas.openxmlformats.org/drawingml/2006/main" xmlns:r="http://schemas.openxmlformats.org/officeDocument/2006/relationships" xmlns:p="http://schemas.openxmlformats.org/presentationml/2006/main">
+  <p:cSld>
+    <p:spTree>
+      <p:nvGrpSpPr>
+        <p:cNvPr id="1" name=""/>
+        <p:cNvGrpSpPr/>
+        <p:nvPr/>
+      </p:nvGrpSpPr>
+      <p:grpSpPr>
+        <a:xfrm>
+          <a:off x="0" y="0"/>
+          <a:ext cx="0" cy="0"/>
+          <a:chOff x="0" y="0"/>
+          <a:chExt cx="0" cy="0"/>
+        </a:xfrm>
+      </p:grpSpPr>
+      <p:sp>
+        <p:nvSpPr>
           <p:cNvPr id="2" name="Titre 1">
             <a:extLst>
               <a:ext uri="{FF2B5EF4-FFF2-40B4-BE49-F238E27FC236}">
@@ -14997,7 +15134,7 @@
           <a:p>
             <a:fld id="{4EA40E75-4466-4188-A2CC-18D20372CC4F}" type="slidenum">
               <a:rPr lang="fr-FR" smtClean="0"/>
-              <a:t>10</a:t>
+              <a:t>11</a:t>
             </a:fld>
             <a:endParaRPr lang="fr-FR" dirty="0"/>
           </a:p>
@@ -15016,7 +15153,113 @@
 </p:sld>
 </file>
 
-<file path=ppt/slides/slide11.xml><?xml version="1.0" encoding="utf-8"?>
+<file path=ppt/slides/slide12.xml><?xml version="1.0" encoding="utf-8"?>
+<p:sld xmlns:a="http://schemas.openxmlformats.org/drawingml/2006/main" xmlns:r="http://schemas.openxmlformats.org/officeDocument/2006/relationships" xmlns:p="http://schemas.openxmlformats.org/presentationml/2006/main">
+  <p:cSld>
+    <p:spTree>
+      <p:nvGrpSpPr>
+        <p:cNvPr id="1" name=""/>
+        <p:cNvGrpSpPr/>
+        <p:nvPr/>
+      </p:nvGrpSpPr>
+      <p:grpSpPr>
+        <a:xfrm>
+          <a:off x="0" y="0"/>
+          <a:ext cx="0" cy="0"/>
+          <a:chOff x="0" y="0"/>
+          <a:chExt cx="0" cy="0"/>
+        </a:xfrm>
+      </p:grpSpPr>
+      <p:sp>
+        <p:nvSpPr>
+          <p:cNvPr id="2" name="Espace réservé du numéro de diapositive 1">
+            <a:extLst>
+              <a:ext uri="{FF2B5EF4-FFF2-40B4-BE49-F238E27FC236}">
+                <a16:creationId xmlns:a16="http://schemas.microsoft.com/office/drawing/2014/main" id="{0B6E6EB4-798D-4C83-ACE3-01765F26EA30}"/>
+              </a:ext>
+            </a:extLst>
+          </p:cNvPr>
+          <p:cNvSpPr>
+            <a:spLocks noGrp="1"/>
+          </p:cNvSpPr>
+          <p:nvPr>
+            <p:ph type="sldNum" sz="quarter" idx="12"/>
+          </p:nvPr>
+        </p:nvSpPr>
+        <p:spPr/>
+        <p:txBody>
+          <a:bodyPr/>
+          <a:lstStyle/>
+          <a:p>
+            <a:fld id="{4EA40E75-4466-4188-A2CC-18D20372CC4F}" type="slidenum">
+              <a:rPr lang="fr-FR" smtClean="0"/>
+              <a:t>12</a:t>
+            </a:fld>
+            <a:endParaRPr lang="fr-FR"/>
+          </a:p>
+        </p:txBody>
+      </p:sp>
+      <p:pic>
+        <p:nvPicPr>
+          <p:cNvPr id="1026" name="Picture 2" descr="Donald Trump Whatever GIF by Mashable">
+            <a:extLst>
+              <a:ext uri="{FF2B5EF4-FFF2-40B4-BE49-F238E27FC236}">
+                <a16:creationId xmlns:a16="http://schemas.microsoft.com/office/drawing/2014/main" id="{40DB7BC4-DDB1-4DD1-8777-F9DC8B9B8330}"/>
+              </a:ext>
+            </a:extLst>
+          </p:cNvPr>
+          <p:cNvPicPr>
+            <a:picLocks noChangeAspect="1" noChangeArrowheads="1" noCrop="1"/>
+          </p:cNvPicPr>
+          <p:nvPr/>
+        </p:nvPicPr>
+        <p:blipFill>
+          <a:blip r:embed="rId2">
+            <a:extLst>
+              <a:ext uri="{28A0092B-C50C-407E-A947-70E740481C1C}">
+                <a14:useLocalDpi xmlns:a14="http://schemas.microsoft.com/office/drawing/2010/main" val="0"/>
+              </a:ext>
+            </a:extLst>
+          </a:blip>
+          <a:srcRect/>
+          <a:stretch>
+            <a:fillRect/>
+          </a:stretch>
+        </p:blipFill>
+        <p:spPr bwMode="auto">
+          <a:xfrm>
+            <a:off x="2727571" y="2092322"/>
+            <a:ext cx="6736857" cy="2673356"/>
+          </a:xfrm>
+          <a:prstGeom prst="rect">
+            <a:avLst/>
+          </a:prstGeom>
+          <a:noFill/>
+          <a:extLst>
+            <a:ext uri="{909E8E84-426E-40DD-AFC4-6F175D3DCCD1}">
+              <a14:hiddenFill xmlns:a14="http://schemas.microsoft.com/office/drawing/2010/main">
+                <a:solidFill>
+                  <a:srgbClr val="FFFFFF"/>
+                </a:solidFill>
+              </a14:hiddenFill>
+            </a:ext>
+          </a:extLst>
+        </p:spPr>
+      </p:pic>
+    </p:spTree>
+    <p:extLst>
+      <p:ext uri="{BB962C8B-B14F-4D97-AF65-F5344CB8AC3E}">
+        <p14:creationId xmlns:p14="http://schemas.microsoft.com/office/powerpoint/2010/main" val="3151139056"/>
+      </p:ext>
+    </p:extLst>
+  </p:cSld>
+  <p:clrMapOvr>
+    <a:masterClrMapping/>
+  </p:clrMapOvr>
+</p:sld>
+</file>
+
+<file path=ppt/slides/slide13.xml><?xml version="1.0" encoding="utf-8"?>
 <p:sld xmlns:a="http://schemas.openxmlformats.org/drawingml/2006/main" xmlns:r="http://schemas.openxmlformats.org/officeDocument/2006/relationships" xmlns:p="http://schemas.openxmlformats.org/presentationml/2006/main">
   <p:cSld>
     <p:spTree>
@@ -15172,7 +15415,7 @@
           <a:p>
             <a:fld id="{4EA40E75-4466-4188-A2CC-18D20372CC4F}" type="slidenum">
               <a:rPr lang="fr-FR" smtClean="0"/>
-              <a:t>11</a:t>
+              <a:t>13</a:t>
             </a:fld>
             <a:endParaRPr lang="fr-FR"/>
           </a:p>
@@ -15191,7 +15434,7 @@
 </p:sld>
 </file>
 
-<file path=ppt/slides/slide12.xml><?xml version="1.0" encoding="utf-8"?>
+<file path=ppt/slides/slide14.xml><?xml version="1.0" encoding="utf-8"?>
 <p:sld xmlns:a="http://schemas.openxmlformats.org/drawingml/2006/main" xmlns:r="http://schemas.openxmlformats.org/officeDocument/2006/relationships" xmlns:p="http://schemas.openxmlformats.org/presentationml/2006/main">
   <p:cSld>
     <p:spTree>
@@ -15259,7 +15502,7 @@
           <a:p>
             <a:fld id="{4EA40E75-4466-4188-A2CC-18D20372CC4F}" type="slidenum">
               <a:rPr lang="fr-FR" smtClean="0"/>
-              <a:t>12</a:t>
+              <a:t>14</a:t>
             </a:fld>
             <a:endParaRPr lang="fr-FR"/>
           </a:p>
@@ -15269,277 +15512,6 @@
     <p:extLst>
       <p:ext uri="{BB962C8B-B14F-4D97-AF65-F5344CB8AC3E}">
         <p14:creationId xmlns:p14="http://schemas.microsoft.com/office/powerpoint/2010/main" val="519347202"/>
-      </p:ext>
-    </p:extLst>
-  </p:cSld>
-  <p:clrMapOvr>
-    <a:masterClrMapping/>
-  </p:clrMapOvr>
-</p:sld>
-</file>
-
-<file path=ppt/slides/slide13.xml><?xml version="1.0" encoding="utf-8"?>
-<p:sld xmlns:a="http://schemas.openxmlformats.org/drawingml/2006/main" xmlns:r="http://schemas.openxmlformats.org/officeDocument/2006/relationships" xmlns:p="http://schemas.openxmlformats.org/presentationml/2006/main">
-  <p:cSld>
-    <p:spTree>
-      <p:nvGrpSpPr>
-        <p:cNvPr id="1" name=""/>
-        <p:cNvGrpSpPr/>
-        <p:nvPr/>
-      </p:nvGrpSpPr>
-      <p:grpSpPr>
-        <a:xfrm>
-          <a:off x="0" y="0"/>
-          <a:ext cx="0" cy="0"/>
-          <a:chOff x="0" y="0"/>
-          <a:chExt cx="0" cy="0"/>
-        </a:xfrm>
-      </p:grpSpPr>
-      <p:sp>
-        <p:nvSpPr>
-          <p:cNvPr id="2" name="Titre 1">
-            <a:extLst>
-              <a:ext uri="{FF2B5EF4-FFF2-40B4-BE49-F238E27FC236}">
-                <a16:creationId xmlns:a16="http://schemas.microsoft.com/office/drawing/2014/main" id="{14D16DC2-CFB3-4DD0-939E-9B64E6F726E7}"/>
-              </a:ext>
-            </a:extLst>
-          </p:cNvPr>
-          <p:cNvSpPr>
-            <a:spLocks noGrp="1"/>
-          </p:cNvSpPr>
-          <p:nvPr>
-            <p:ph type="title"/>
-          </p:nvPr>
-        </p:nvSpPr>
-        <p:spPr/>
-        <p:txBody>
-          <a:bodyPr/>
-          <a:lstStyle/>
-          <a:p>
-            <a:r>
-              <a:rPr lang="fr-FR" dirty="0" err="1"/>
-              <a:t>Kotlin</a:t>
-            </a:r>
-            <a:r>
-              <a:rPr lang="fr-FR" dirty="0"/>
-              <a:t>: Plugin Maven</a:t>
-            </a:r>
-          </a:p>
-        </p:txBody>
-      </p:sp>
-      <p:pic>
-        <p:nvPicPr>
-          <p:cNvPr id="7" name="Image 6">
-            <a:extLst>
-              <a:ext uri="{FF2B5EF4-FFF2-40B4-BE49-F238E27FC236}">
-                <a16:creationId xmlns:a16="http://schemas.microsoft.com/office/drawing/2014/main" id="{E8704358-BB5B-4180-9269-766B0A790816}"/>
-              </a:ext>
-            </a:extLst>
-          </p:cNvPr>
-          <p:cNvPicPr>
-            <a:picLocks noChangeAspect="1"/>
-          </p:cNvPicPr>
-          <p:nvPr/>
-        </p:nvPicPr>
-        <p:blipFill>
-          <a:blip r:embed="rId2"/>
-          <a:stretch>
-            <a:fillRect/>
-          </a:stretch>
-        </p:blipFill>
-        <p:spPr>
-          <a:xfrm>
-            <a:off x="3819525" y="1690688"/>
-            <a:ext cx="4552950" cy="4467225"/>
-          </a:xfrm>
-          <a:prstGeom prst="rect">
-            <a:avLst/>
-          </a:prstGeom>
-        </p:spPr>
-      </p:pic>
-      <p:sp>
-        <p:nvSpPr>
-          <p:cNvPr id="3" name="Espace réservé du numéro de diapositive 2">
-            <a:extLst>
-              <a:ext uri="{FF2B5EF4-FFF2-40B4-BE49-F238E27FC236}">
-                <a16:creationId xmlns:a16="http://schemas.microsoft.com/office/drawing/2014/main" id="{12E25528-0074-42EE-8CF5-71856A4F8FF3}"/>
-              </a:ext>
-            </a:extLst>
-          </p:cNvPr>
-          <p:cNvSpPr>
-            <a:spLocks noGrp="1"/>
-          </p:cNvSpPr>
-          <p:nvPr>
-            <p:ph type="sldNum" sz="quarter" idx="12"/>
-          </p:nvPr>
-        </p:nvSpPr>
-        <p:spPr/>
-        <p:txBody>
-          <a:bodyPr/>
-          <a:lstStyle/>
-          <a:p>
-            <a:fld id="{4EA40E75-4466-4188-A2CC-18D20372CC4F}" type="slidenum">
-              <a:rPr lang="fr-FR" smtClean="0"/>
-              <a:t>13</a:t>
-            </a:fld>
-            <a:endParaRPr lang="fr-FR"/>
-          </a:p>
-        </p:txBody>
-      </p:sp>
-    </p:spTree>
-    <p:extLst>
-      <p:ext uri="{BB962C8B-B14F-4D97-AF65-F5344CB8AC3E}">
-        <p14:creationId xmlns:p14="http://schemas.microsoft.com/office/powerpoint/2010/main" val="2793017779"/>
-      </p:ext>
-    </p:extLst>
-  </p:cSld>
-  <p:clrMapOvr>
-    <a:masterClrMapping/>
-  </p:clrMapOvr>
-</p:sld>
-</file>
-
-<file path=ppt/slides/slide14.xml><?xml version="1.0" encoding="utf-8"?>
-<p:sld xmlns:a="http://schemas.openxmlformats.org/drawingml/2006/main" xmlns:r="http://schemas.openxmlformats.org/officeDocument/2006/relationships" xmlns:p="http://schemas.openxmlformats.org/presentationml/2006/main">
-  <p:cSld>
-    <p:spTree>
-      <p:nvGrpSpPr>
-        <p:cNvPr id="1" name=""/>
-        <p:cNvGrpSpPr/>
-        <p:nvPr/>
-      </p:nvGrpSpPr>
-      <p:grpSpPr>
-        <a:xfrm>
-          <a:off x="0" y="0"/>
-          <a:ext cx="0" cy="0"/>
-          <a:chOff x="0" y="0"/>
-          <a:chExt cx="0" cy="0"/>
-        </a:xfrm>
-      </p:grpSpPr>
-      <p:sp>
-        <p:nvSpPr>
-          <p:cNvPr id="2" name="Titre 1">
-            <a:extLst>
-              <a:ext uri="{FF2B5EF4-FFF2-40B4-BE49-F238E27FC236}">
-                <a16:creationId xmlns:a16="http://schemas.microsoft.com/office/drawing/2014/main" id="{6E33D6BB-140C-4904-A100-540C504E2B3E}"/>
-              </a:ext>
-            </a:extLst>
-          </p:cNvPr>
-          <p:cNvSpPr>
-            <a:spLocks noGrp="1"/>
-          </p:cNvSpPr>
-          <p:nvPr>
-            <p:ph type="title"/>
-          </p:nvPr>
-        </p:nvSpPr>
-        <p:spPr/>
-        <p:txBody>
-          <a:bodyPr/>
-          <a:lstStyle/>
-          <a:p>
-            <a:r>
-              <a:rPr lang="fr-FR" dirty="0" err="1"/>
-              <a:t>Kotlin</a:t>
-            </a:r>
-            <a:r>
-              <a:rPr lang="fr-FR" dirty="0"/>
-              <a:t>: Les avantages</a:t>
-            </a:r>
-          </a:p>
-        </p:txBody>
-      </p:sp>
-      <p:sp>
-        <p:nvSpPr>
-          <p:cNvPr id="3" name="Espace réservé du contenu 2">
-            <a:extLst>
-              <a:ext uri="{FF2B5EF4-FFF2-40B4-BE49-F238E27FC236}">
-                <a16:creationId xmlns:a16="http://schemas.microsoft.com/office/drawing/2014/main" id="{9DDA91F2-CE38-4AEF-8FAF-36870E137B96}"/>
-              </a:ext>
-            </a:extLst>
-          </p:cNvPr>
-          <p:cNvSpPr>
-            <a:spLocks noGrp="1"/>
-          </p:cNvSpPr>
-          <p:nvPr>
-            <p:ph idx="1"/>
-          </p:nvPr>
-        </p:nvSpPr>
-        <p:spPr>
-          <a:xfrm>
-            <a:off x="838200" y="3051544"/>
-            <a:ext cx="10179424" cy="3160998"/>
-          </a:xfrm>
-        </p:spPr>
-        <p:txBody>
-          <a:bodyPr/>
-          <a:lstStyle/>
-          <a:p>
-            <a:r>
-              <a:rPr lang="fr-FR" dirty="0"/>
-              <a:t>Compatibilité totale avec l’</a:t>
-            </a:r>
-            <a:r>
-              <a:rPr lang="fr-FR" dirty="0" err="1"/>
-              <a:t>éco-système</a:t>
-            </a:r>
-            <a:r>
-              <a:rPr lang="fr-FR" dirty="0"/>
-              <a:t> java</a:t>
-            </a:r>
-          </a:p>
-          <a:p>
-            <a:endParaRPr lang="fr-FR" dirty="0"/>
-          </a:p>
-          <a:p>
-            <a:r>
-              <a:rPr lang="fr-FR" dirty="0"/>
-              <a:t>Syntaxe bien plus modernes</a:t>
-            </a:r>
-          </a:p>
-          <a:p>
-            <a:endParaRPr lang="fr-FR" dirty="0"/>
-          </a:p>
-          <a:p>
-            <a:r>
-              <a:rPr lang="fr-FR" dirty="0"/>
-              <a:t>Supporté officiellement par Google</a:t>
-            </a:r>
-          </a:p>
-        </p:txBody>
-      </p:sp>
-      <p:sp>
-        <p:nvSpPr>
-          <p:cNvPr id="4" name="Espace réservé du numéro de diapositive 3">
-            <a:extLst>
-              <a:ext uri="{FF2B5EF4-FFF2-40B4-BE49-F238E27FC236}">
-                <a16:creationId xmlns:a16="http://schemas.microsoft.com/office/drawing/2014/main" id="{2707AD6E-A94B-4CC2-8EA9-F375C6794BED}"/>
-              </a:ext>
-            </a:extLst>
-          </p:cNvPr>
-          <p:cNvSpPr>
-            <a:spLocks noGrp="1"/>
-          </p:cNvSpPr>
-          <p:nvPr>
-            <p:ph type="sldNum" sz="quarter" idx="12"/>
-          </p:nvPr>
-        </p:nvSpPr>
-        <p:spPr/>
-        <p:txBody>
-          <a:bodyPr/>
-          <a:lstStyle/>
-          <a:p>
-            <a:fld id="{4EA40E75-4466-4188-A2CC-18D20372CC4F}" type="slidenum">
-              <a:rPr lang="fr-FR" smtClean="0"/>
-              <a:t>14</a:t>
-            </a:fld>
-            <a:endParaRPr lang="fr-FR"/>
-          </a:p>
-        </p:txBody>
-      </p:sp>
-    </p:spTree>
-    <p:extLst>
-      <p:ext uri="{BB962C8B-B14F-4D97-AF65-F5344CB8AC3E}">
-        <p14:creationId xmlns:p14="http://schemas.microsoft.com/office/powerpoint/2010/main" val="1062322313"/>
       </p:ext>
     </p:extLst>
   </p:cSld>
@@ -15598,59 +15570,70 @@
           </a:p>
         </p:txBody>
       </p:sp>
-      <p:pic>
-        <p:nvPicPr>
-          <p:cNvPr id="1026" name="Picture 2">
+      <p:sp>
+        <p:nvSpPr>
+          <p:cNvPr id="3" name="Espace réservé du contenu 2">
             <a:extLst>
               <a:ext uri="{FF2B5EF4-FFF2-40B4-BE49-F238E27FC236}">
-                <a16:creationId xmlns:a16="http://schemas.microsoft.com/office/drawing/2014/main" id="{3B592CAD-8C9D-49CF-8417-AFDEF0C0236B}"/>
+                <a16:creationId xmlns:a16="http://schemas.microsoft.com/office/drawing/2014/main" id="{9DDA91F2-CE38-4AEF-8FAF-36870E137B96}"/>
               </a:ext>
             </a:extLst>
           </p:cNvPr>
-          <p:cNvPicPr>
-            <a:picLocks noChangeAspect="1" noChangeArrowheads="1"/>
-          </p:cNvPicPr>
-          <p:nvPr/>
-        </p:nvPicPr>
-        <p:blipFill>
-          <a:blip r:embed="rId2">
-            <a:extLst>
-              <a:ext uri="{28A0092B-C50C-407E-A947-70E740481C1C}">
-                <a14:useLocalDpi xmlns:a14="http://schemas.microsoft.com/office/drawing/2010/main" val="0"/>
-              </a:ext>
-            </a:extLst>
-          </a:blip>
-          <a:srcRect/>
-          <a:stretch>
-            <a:fillRect/>
-          </a:stretch>
-        </p:blipFill>
-        <p:spPr bwMode="auto">
+          <p:cNvSpPr>
+            <a:spLocks noGrp="1"/>
+          </p:cNvSpPr>
+          <p:nvPr>
+            <p:ph idx="1"/>
+          </p:nvPr>
+        </p:nvSpPr>
+        <p:spPr>
           <a:xfrm>
-            <a:off x="4188759" y="2390971"/>
-            <a:ext cx="3814482" cy="3814482"/>
+            <a:off x="838200" y="3069299"/>
+            <a:ext cx="10179424" cy="3160998"/>
           </a:xfrm>
-          <a:prstGeom prst="rect">
-            <a:avLst/>
-          </a:prstGeom>
-          <a:noFill/>
-          <a:extLst>
-            <a:ext uri="{909E8E84-426E-40DD-AFC4-6F175D3DCCD1}">
-              <a14:hiddenFill xmlns:a14="http://schemas.microsoft.com/office/drawing/2010/main">
-                <a:solidFill>
-                  <a:srgbClr val="FFFFFF"/>
-                </a:solidFill>
-              </a14:hiddenFill>
-            </a:ext>
-          </a:extLst>
         </p:spPr>
-      </p:pic>
+        <p:txBody>
+          <a:bodyPr/>
+          <a:lstStyle/>
+          <a:p>
+            <a:r>
+              <a:rPr lang="fr-FR" dirty="0"/>
+              <a:t>Absence de </a:t>
+            </a:r>
+            <a:r>
+              <a:rPr lang="fr-FR" dirty="0" err="1"/>
+              <a:t>checked</a:t>
+            </a:r>
+            <a:r>
+              <a:rPr lang="fr-FR" dirty="0"/>
+              <a:t> exceptions</a:t>
+            </a:r>
+          </a:p>
+          <a:p>
+            <a:endParaRPr lang="fr-FR" dirty="0"/>
+          </a:p>
+          <a:p>
+            <a:r>
+              <a:rPr lang="fr-FR" dirty="0"/>
+              <a:t>Beaucoup d’annotations à ajouter pour importer du </a:t>
+            </a:r>
+            <a:r>
+              <a:rPr lang="fr-FR" dirty="0" err="1"/>
+              <a:t>Kotlin</a:t>
+            </a:r>
+            <a:r>
+              <a:rPr lang="fr-FR" dirty="0"/>
+              <a:t> dans du Java </a:t>
+            </a:r>
+          </a:p>
+        </p:txBody>
+      </p:sp>
       <p:sp>
         <p:nvSpPr>
-          <p:cNvPr id="3" name="Espace réservé du numéro de diapositive 2">
+          <p:cNvPr id="4" name="Espace réservé du numéro de diapositive 3">
             <a:extLst>
               <a:ext uri="{FF2B5EF4-FFF2-40B4-BE49-F238E27FC236}">
-                <a16:creationId xmlns:a16="http://schemas.microsoft.com/office/drawing/2014/main" id="{69CF89B8-11D5-49E3-8C6A-BA3745E9440C}"/>
+                <a16:creationId xmlns:a16="http://schemas.microsoft.com/office/drawing/2014/main" id="{2707AD6E-A94B-4CC2-8EA9-F375C6794BED}"/>
               </a:ext>
             </a:extLst>
           </p:cNvPr>
@@ -15677,7 +15660,7 @@
     </p:spTree>
     <p:extLst>
       <p:ext uri="{BB962C8B-B14F-4D97-AF65-F5344CB8AC3E}">
-        <p14:creationId xmlns:p14="http://schemas.microsoft.com/office/powerpoint/2010/main" val="1460288209"/>
+        <p14:creationId xmlns:p14="http://schemas.microsoft.com/office/powerpoint/2010/main" val="1062322313"/>
       </p:ext>
     </p:extLst>
   </p:cSld>
@@ -15688,6 +15671,165 @@
 </file>
 
 <file path=ppt/slides/slide16.xml><?xml version="1.0" encoding="utf-8"?>
+<p:sld xmlns:a="http://schemas.openxmlformats.org/drawingml/2006/main" xmlns:r="http://schemas.openxmlformats.org/officeDocument/2006/relationships" xmlns:p="http://schemas.openxmlformats.org/presentationml/2006/main">
+  <p:cSld>
+    <p:spTree>
+      <p:nvGrpSpPr>
+        <p:cNvPr id="1" name=""/>
+        <p:cNvGrpSpPr/>
+        <p:nvPr/>
+      </p:nvGrpSpPr>
+      <p:grpSpPr>
+        <a:xfrm>
+          <a:off x="0" y="0"/>
+          <a:ext cx="0" cy="0"/>
+          <a:chOff x="0" y="0"/>
+          <a:chExt cx="0" cy="0"/>
+        </a:xfrm>
+      </p:grpSpPr>
+      <p:sp>
+        <p:nvSpPr>
+          <p:cNvPr id="2" name="Titre 1">
+            <a:extLst>
+              <a:ext uri="{FF2B5EF4-FFF2-40B4-BE49-F238E27FC236}">
+                <a16:creationId xmlns:a16="http://schemas.microsoft.com/office/drawing/2014/main" id="{6E33D6BB-140C-4904-A100-540C504E2B3E}"/>
+              </a:ext>
+            </a:extLst>
+          </p:cNvPr>
+          <p:cNvSpPr>
+            <a:spLocks noGrp="1"/>
+          </p:cNvSpPr>
+          <p:nvPr>
+            <p:ph type="title"/>
+          </p:nvPr>
+        </p:nvSpPr>
+        <p:spPr/>
+        <p:txBody>
+          <a:bodyPr/>
+          <a:lstStyle/>
+          <a:p>
+            <a:r>
+              <a:rPr lang="fr-FR" dirty="0" err="1"/>
+              <a:t>Kotlin</a:t>
+            </a:r>
+            <a:r>
+              <a:rPr lang="fr-FR" dirty="0"/>
+              <a:t>: Les avantages</a:t>
+            </a:r>
+          </a:p>
+        </p:txBody>
+      </p:sp>
+      <p:sp>
+        <p:nvSpPr>
+          <p:cNvPr id="3" name="Espace réservé du contenu 2">
+            <a:extLst>
+              <a:ext uri="{FF2B5EF4-FFF2-40B4-BE49-F238E27FC236}">
+                <a16:creationId xmlns:a16="http://schemas.microsoft.com/office/drawing/2014/main" id="{9DDA91F2-CE38-4AEF-8FAF-36870E137B96}"/>
+              </a:ext>
+            </a:extLst>
+          </p:cNvPr>
+          <p:cNvSpPr>
+            <a:spLocks noGrp="1"/>
+          </p:cNvSpPr>
+          <p:nvPr>
+            <p:ph idx="1"/>
+          </p:nvPr>
+        </p:nvSpPr>
+        <p:spPr>
+          <a:xfrm>
+            <a:off x="838200" y="2856235"/>
+            <a:ext cx="10179424" cy="3160998"/>
+          </a:xfrm>
+        </p:spPr>
+        <p:txBody>
+          <a:bodyPr/>
+          <a:lstStyle/>
+          <a:p>
+            <a:r>
+              <a:rPr lang="fr-FR" dirty="0"/>
+              <a:t>Compatibilité totale avec l’</a:t>
+            </a:r>
+            <a:r>
+              <a:rPr lang="fr-FR" dirty="0" err="1"/>
+              <a:t>éco-système</a:t>
+            </a:r>
+            <a:r>
+              <a:rPr lang="fr-FR" dirty="0"/>
+              <a:t> java</a:t>
+            </a:r>
+          </a:p>
+          <a:p>
+            <a:endParaRPr lang="fr-FR" dirty="0"/>
+          </a:p>
+          <a:p>
+            <a:r>
+              <a:rPr lang="fr-FR" dirty="0"/>
+              <a:t>Syntaxe plus modernes</a:t>
+            </a:r>
+          </a:p>
+          <a:p>
+            <a:endParaRPr lang="fr-FR" dirty="0"/>
+          </a:p>
+          <a:p>
+            <a:r>
+              <a:rPr lang="fr-FR" dirty="0"/>
+              <a:t>API plus complète</a:t>
+            </a:r>
+          </a:p>
+          <a:p>
+            <a:endParaRPr lang="fr-FR" dirty="0"/>
+          </a:p>
+          <a:p>
+            <a:r>
+              <a:rPr lang="fr-FR" dirty="0"/>
+              <a:t>Supporté officiellement par Google</a:t>
+            </a:r>
+          </a:p>
+        </p:txBody>
+      </p:sp>
+      <p:sp>
+        <p:nvSpPr>
+          <p:cNvPr id="4" name="Espace réservé du numéro de diapositive 3">
+            <a:extLst>
+              <a:ext uri="{FF2B5EF4-FFF2-40B4-BE49-F238E27FC236}">
+                <a16:creationId xmlns:a16="http://schemas.microsoft.com/office/drawing/2014/main" id="{2707AD6E-A94B-4CC2-8EA9-F375C6794BED}"/>
+              </a:ext>
+            </a:extLst>
+          </p:cNvPr>
+          <p:cNvSpPr>
+            <a:spLocks noGrp="1"/>
+          </p:cNvSpPr>
+          <p:nvPr>
+            <p:ph type="sldNum" sz="quarter" idx="12"/>
+          </p:nvPr>
+        </p:nvSpPr>
+        <p:spPr/>
+        <p:txBody>
+          <a:bodyPr/>
+          <a:lstStyle/>
+          <a:p>
+            <a:fld id="{4EA40E75-4466-4188-A2CC-18D20372CC4F}" type="slidenum">
+              <a:rPr lang="fr-FR" smtClean="0"/>
+              <a:t>16</a:t>
+            </a:fld>
+            <a:endParaRPr lang="fr-FR"/>
+          </a:p>
+        </p:txBody>
+      </p:sp>
+    </p:spTree>
+    <p:extLst>
+      <p:ext uri="{BB962C8B-B14F-4D97-AF65-F5344CB8AC3E}">
+        <p14:creationId xmlns:p14="http://schemas.microsoft.com/office/powerpoint/2010/main" val="216103125"/>
+      </p:ext>
+    </p:extLst>
+  </p:cSld>
+  <p:clrMapOvr>
+    <a:masterClrMapping/>
+  </p:clrMapOvr>
+</p:sld>
+</file>
+
+<file path=ppt/slides/slide17.xml><?xml version="1.0" encoding="utf-8"?>
 <p:sld xmlns:a="http://schemas.openxmlformats.org/drawingml/2006/main" xmlns:r="http://schemas.openxmlformats.org/officeDocument/2006/relationships" xmlns:p="http://schemas.openxmlformats.org/presentationml/2006/main">
   <p:cSld>
     <p:spTree>
@@ -15780,7 +15922,7 @@
           <a:p>
             <a:fld id="{4EA40E75-4466-4188-A2CC-18D20372CC4F}" type="slidenum">
               <a:rPr lang="fr-FR" smtClean="0"/>
-              <a:t>16</a:t>
+              <a:t>17</a:t>
             </a:fld>
             <a:endParaRPr lang="fr-FR"/>
           </a:p>
@@ -16471,8 +16613,8 @@
           </a:p>
         </p:txBody>
       </p:sp>
-      <mc:AlternateContent xmlns:mc="http://schemas.openxmlformats.org/markup-compatibility/2006">
-        <mc:Choice xmlns:a14="http://schemas.microsoft.com/office/drawing/2010/main" Requires="a14">
+      <mc:AlternateContent xmlns:mc="http://schemas.openxmlformats.org/markup-compatibility/2006" xmlns:a14="http://schemas.microsoft.com/office/drawing/2010/main">
+        <mc:Choice Requires="a14">
           <p:sp>
             <p:nvSpPr>
               <p:cNvPr id="5" name="Espace réservé du contenu 4">
@@ -16683,7 +16825,7 @@
             </p:txBody>
           </p:sp>
         </mc:Choice>
-        <mc:Fallback>
+        <mc:Fallback xmlns="">
           <p:sp>
             <p:nvSpPr>
               <p:cNvPr id="5" name="Espace réservé du contenu 4">

</xml_diff>